<commit_message>
docs: subgradient method 내용추가
</commit_message>
<xml_diff>
--- a/slides/GPS최소외접원.pptx
+++ b/slides/GPS최소외접원.pptx
@@ -19,11 +19,14 @@
     <p:sldId id="266" r:id="rId13"/>
     <p:sldId id="271" r:id="rId14"/>
     <p:sldId id="273" r:id="rId15"/>
-    <p:sldId id="276" r:id="rId16"/>
-    <p:sldId id="277" r:id="rId17"/>
-    <p:sldId id="278" r:id="rId18"/>
-    <p:sldId id="279" r:id="rId19"/>
-    <p:sldId id="280" r:id="rId20"/>
+    <p:sldId id="282" r:id="rId16"/>
+    <p:sldId id="284" r:id="rId17"/>
+    <p:sldId id="283" r:id="rId18"/>
+    <p:sldId id="276" r:id="rId19"/>
+    <p:sldId id="277" r:id="rId20"/>
+    <p:sldId id="278" r:id="rId21"/>
+    <p:sldId id="279" r:id="rId22"/>
+    <p:sldId id="280" r:id="rId23"/>
   </p:sldIdLst>
   <p:sldSz cx="12192000" cy="6858000"/>
   <p:notesSz cx="6858000" cy="9144000"/>
@@ -134,7 +137,8 @@
 <p1510:revInfo xmlns:a="http://schemas.openxmlformats.org/drawingml/2006/main" xmlns:r="http://schemas.openxmlformats.org/officeDocument/2006/relationships" xmlns:p1510="http://schemas.microsoft.com/office/powerpoint/2015/10/main">
   <p1510:revLst>
     <p1510:client id="{181B1806-7E30-5B32-F797-1FDA66B60D9D}" v="10" dt="2025-10-26T18:47:23.407"/>
-    <p1510:client id="{8408600A-75C0-5006-5383-97DA4BF452AB}" v="479" dt="2025-10-27T11:05:14.263"/>
+    <p1510:client id="{8408600A-75C0-5006-5383-97DA4BF452AB}" v="636" dt="2025-10-27T11:40:59.804"/>
+    <p1510:client id="{BB7B28C5-6F0D-2E58-DCE4-E4BC7B61CEF8}" v="37" dt="2025-10-27T11:47:54.648"/>
   </p1510:revLst>
 </p1510:revInfo>
 </file>
@@ -4112,18 +4116,7 @@
             </a:endParaRPr>
           </a:p>
           <a:p>
-            <a:pPr marL="0" indent="0">
-              <a:buNone/>
-            </a:pPr>
-            <a:endParaRPr lang="ko-KR" altLang="en-US" dirty="0">
-              <a:ea typeface="맑은 고딕"/>
-            </a:endParaRPr>
-          </a:p>
-          <a:p>
-            <a:pPr marL="0" indent="0">
-              <a:buNone/>
-            </a:pPr>
-            <a:endParaRPr lang="ko-KR" altLang="en-US" dirty="0">
+            <a:endParaRPr lang="ko-KR" dirty="0">
               <a:ea typeface="+mn-lt"/>
               <a:cs typeface="+mn-lt"/>
             </a:endParaRPr>
@@ -4457,36 +4450,6 @@
           </a:p>
         </p:txBody>
       </p:sp>
-      <p:pic>
-        <p:nvPicPr>
-          <p:cNvPr id="4" name="그림 3" descr="텍스트, 폰트, 라인, 화이트이(가) 표시된 사진&#10;&#10;AI 생성 콘텐츠는 정확하지 않을 수 있습니다.">
-            <a:extLst>
-              <a:ext uri="{FF2B5EF4-FFF2-40B4-BE49-F238E27FC236}">
-                <a16:creationId xmlns:a16="http://schemas.microsoft.com/office/drawing/2014/main" id="{E4601AD2-C635-5B0A-544C-65805FB226FB}"/>
-              </a:ext>
-            </a:extLst>
-          </p:cNvPr>
-          <p:cNvPicPr>
-            <a:picLocks noChangeAspect="1"/>
-          </p:cNvPicPr>
-          <p:nvPr/>
-        </p:nvPicPr>
-        <p:blipFill>
-          <a:blip r:embed="rId3"/>
-          <a:stretch>
-            <a:fillRect/>
-          </a:stretch>
-        </p:blipFill>
-        <p:spPr>
-          <a:xfrm>
-            <a:off x="3667125" y="2716059"/>
-            <a:ext cx="4857750" cy="704850"/>
-          </a:xfrm>
-          <a:prstGeom prst="rect">
-            <a:avLst/>
-          </a:prstGeom>
-        </p:spPr>
-      </p:pic>
     </p:spTree>
     <p:extLst>
       <p:ext uri="{BB962C8B-B14F-4D97-AF65-F5344CB8AC3E}">
@@ -4522,6 +4485,571 @@
           <p:cNvPr id="2" name="제목 1">
             <a:extLst>
               <a:ext uri="{FF2B5EF4-FFF2-40B4-BE49-F238E27FC236}">
+                <a16:creationId xmlns:a16="http://schemas.microsoft.com/office/drawing/2014/main" id="{0976A1A2-CBF0-6B42-D981-6D2CF7EC23B5}"/>
+              </a:ext>
+            </a:extLst>
+          </p:cNvPr>
+          <p:cNvSpPr>
+            <a:spLocks noGrp="1"/>
+          </p:cNvSpPr>
+          <p:nvPr>
+            <p:ph type="title"/>
+          </p:nvPr>
+        </p:nvSpPr>
+        <p:spPr/>
+        <p:txBody>
+          <a:bodyPr/>
+          <a:lstStyle/>
+          <a:p>
+            <a:r>
+              <a:rPr lang="ko-KR" altLang="en-US" dirty="0" err="1">
+                <a:ea typeface="맑은 고딕"/>
+              </a:rPr>
+              <a:t>Subgradient</a:t>
+            </a:r>
+            <a:r>
+              <a:rPr lang="ko-KR" altLang="en-US" dirty="0">
+                <a:ea typeface="맑은 고딕"/>
+              </a:rPr>
+              <a:t> </a:t>
+            </a:r>
+            <a:r>
+              <a:rPr lang="ko-KR" altLang="en-US" dirty="0" err="1">
+                <a:ea typeface="맑은 고딕"/>
+              </a:rPr>
+              <a:t>method</a:t>
+            </a:r>
+            <a:endParaRPr lang="ko-KR" altLang="en-US" dirty="0" err="1"/>
+          </a:p>
+        </p:txBody>
+      </p:sp>
+      <p:pic>
+        <p:nvPicPr>
+          <p:cNvPr id="17" name="그림 16" descr="폰트, 텍스트, 친필, 화이트이(가) 표시된 사진&#10;&#10;AI 생성 콘텐츠는 정확하지 않을 수 있습니다.">
+            <a:extLst>
+              <a:ext uri="{FF2B5EF4-FFF2-40B4-BE49-F238E27FC236}">
+                <a16:creationId xmlns:a16="http://schemas.microsoft.com/office/drawing/2014/main" id="{AAC5AF47-7A6F-2442-FC26-6636053688CD}"/>
+              </a:ext>
+            </a:extLst>
+          </p:cNvPr>
+          <p:cNvPicPr>
+            <a:picLocks noChangeAspect="1"/>
+          </p:cNvPicPr>
+          <p:nvPr/>
+        </p:nvPicPr>
+        <p:blipFill>
+          <a:blip r:embed="rId2"/>
+          <a:srcRect r="72823" b="-1250"/>
+          <a:stretch>
+            <a:fillRect/>
+          </a:stretch>
+        </p:blipFill>
+        <p:spPr>
+          <a:xfrm>
+            <a:off x="845910" y="3327627"/>
+            <a:ext cx="1482288" cy="735704"/>
+          </a:xfrm>
+          <a:prstGeom prst="rect">
+            <a:avLst/>
+          </a:prstGeom>
+        </p:spPr>
+      </p:pic>
+      <p:pic>
+        <p:nvPicPr>
+          <p:cNvPr id="18" name="그림 17" descr="폰트, 텍스트, 친필, 화이트이(가) 표시된 사진&#10;&#10;AI 생성 콘텐츠는 정확하지 않을 수 있습니다.">
+            <a:extLst>
+              <a:ext uri="{FF2B5EF4-FFF2-40B4-BE49-F238E27FC236}">
+                <a16:creationId xmlns:a16="http://schemas.microsoft.com/office/drawing/2014/main" id="{25E18817-BA0D-432E-7494-437EA0229EC2}"/>
+              </a:ext>
+            </a:extLst>
+          </p:cNvPr>
+          <p:cNvPicPr>
+            <a:picLocks noChangeAspect="1"/>
+          </p:cNvPicPr>
+          <p:nvPr/>
+        </p:nvPicPr>
+        <p:blipFill>
+          <a:blip r:embed="rId2"/>
+          <a:srcRect l="11481" r="-166" b="-1250"/>
+          <a:stretch>
+            <a:fillRect/>
+          </a:stretch>
+        </p:blipFill>
+        <p:spPr>
+          <a:xfrm>
+            <a:off x="908276" y="2338839"/>
+            <a:ext cx="4837087" cy="735704"/>
+          </a:xfrm>
+          <a:prstGeom prst="rect">
+            <a:avLst/>
+          </a:prstGeom>
+        </p:spPr>
+      </p:pic>
+    </p:spTree>
+    <p:extLst>
+      <p:ext uri="{BB962C8B-B14F-4D97-AF65-F5344CB8AC3E}">
+        <p14:creationId xmlns:p14="http://schemas.microsoft.com/office/powerpoint/2010/main" val="464220114"/>
+      </p:ext>
+    </p:extLst>
+  </p:cSld>
+  <p:clrMapOvr>
+    <a:masterClrMapping/>
+  </p:clrMapOvr>
+</p:sld>
+</file>
+
+<file path=ppt/slides/slide16.xml><?xml version="1.0" encoding="utf-8"?>
+<p:sld xmlns:a="http://schemas.openxmlformats.org/drawingml/2006/main" xmlns:r="http://schemas.openxmlformats.org/officeDocument/2006/relationships" xmlns:p="http://schemas.openxmlformats.org/presentationml/2006/main">
+  <p:cSld>
+    <p:spTree>
+      <p:nvGrpSpPr>
+        <p:cNvPr id="1" name="">
+          <a:extLst>
+            <a:ext uri="{FF2B5EF4-FFF2-40B4-BE49-F238E27FC236}">
+              <a16:creationId xmlns:a16="http://schemas.microsoft.com/office/drawing/2014/main" id="{5F65F607-C123-B537-7978-3E5F209D9661}"/>
+            </a:ext>
+          </a:extLst>
+        </p:cNvPr>
+        <p:cNvGrpSpPr/>
+        <p:nvPr/>
+      </p:nvGrpSpPr>
+      <p:grpSpPr>
+        <a:xfrm>
+          <a:off x="0" y="0"/>
+          <a:ext cx="0" cy="0"/>
+          <a:chOff x="0" y="0"/>
+          <a:chExt cx="0" cy="0"/>
+        </a:xfrm>
+      </p:grpSpPr>
+      <p:pic>
+        <p:nvPicPr>
+          <p:cNvPr id="5" name="그림 4" descr="텍스트, 라인, 도표, 그래프이(가) 표시된 사진&#10;&#10;AI 생성 콘텐츠는 정확하지 않을 수 있습니다.">
+            <a:extLst>
+              <a:ext uri="{FF2B5EF4-FFF2-40B4-BE49-F238E27FC236}">
+                <a16:creationId xmlns:a16="http://schemas.microsoft.com/office/drawing/2014/main" id="{6C80195E-ED61-3FCA-27F9-0756F49B0F20}"/>
+              </a:ext>
+            </a:extLst>
+          </p:cNvPr>
+          <p:cNvPicPr>
+            <a:picLocks noChangeAspect="1"/>
+          </p:cNvPicPr>
+          <p:nvPr/>
+        </p:nvPicPr>
+        <p:blipFill>
+          <a:blip r:embed="rId2"/>
+          <a:stretch>
+            <a:fillRect/>
+          </a:stretch>
+        </p:blipFill>
+        <p:spPr>
+          <a:xfrm>
+            <a:off x="2727428" y="2350524"/>
+            <a:ext cx="6734175" cy="4248150"/>
+          </a:xfrm>
+          <a:prstGeom prst="rect">
+            <a:avLst/>
+          </a:prstGeom>
+        </p:spPr>
+      </p:pic>
+      <p:sp>
+        <p:nvSpPr>
+          <p:cNvPr id="2" name="제목 1">
+            <a:extLst>
+              <a:ext uri="{FF2B5EF4-FFF2-40B4-BE49-F238E27FC236}">
+                <a16:creationId xmlns:a16="http://schemas.microsoft.com/office/drawing/2014/main" id="{FD986A25-94A2-8B01-962D-3A58ABCAFF08}"/>
+              </a:ext>
+            </a:extLst>
+          </p:cNvPr>
+          <p:cNvSpPr>
+            <a:spLocks noGrp="1"/>
+          </p:cNvSpPr>
+          <p:nvPr>
+            <p:ph type="title"/>
+          </p:nvPr>
+        </p:nvSpPr>
+        <p:spPr/>
+        <p:txBody>
+          <a:bodyPr/>
+          <a:lstStyle/>
+          <a:p>
+            <a:r>
+              <a:rPr lang="ko-KR" altLang="en-US" dirty="0" err="1">
+                <a:ea typeface="맑은 고딕"/>
+              </a:rPr>
+              <a:t>Gradient</a:t>
+            </a:r>
+            <a:r>
+              <a:rPr lang="ko-KR" altLang="en-US" dirty="0">
+                <a:ea typeface="맑은 고딕"/>
+              </a:rPr>
+              <a:t> </a:t>
+            </a:r>
+            <a:r>
+              <a:rPr lang="ko-KR" altLang="en-US" dirty="0" err="1">
+                <a:ea typeface="맑은 고딕"/>
+              </a:rPr>
+              <a:t>descent</a:t>
+            </a:r>
+          </a:p>
+        </p:txBody>
+      </p:sp>
+      <p:pic>
+        <p:nvPicPr>
+          <p:cNvPr id="4" name="내용 개체 틀 3" descr="폰트, 라인, 화이트, 서예이(가) 표시된 사진&#10;&#10;AI 생성 콘텐츠는 정확하지 않을 수 있습니다.">
+            <a:extLst>
+              <a:ext uri="{FF2B5EF4-FFF2-40B4-BE49-F238E27FC236}">
+                <a16:creationId xmlns:a16="http://schemas.microsoft.com/office/drawing/2014/main" id="{D8A488DE-5E73-CB89-D2BF-5FF21F737065}"/>
+              </a:ext>
+            </a:extLst>
+          </p:cNvPr>
+          <p:cNvPicPr>
+            <a:picLocks noGrp="1" noChangeAspect="1"/>
+          </p:cNvPicPr>
+          <p:nvPr>
+            <p:ph idx="1"/>
+          </p:nvPr>
+        </p:nvPicPr>
+        <p:blipFill>
+          <a:blip r:embed="rId3"/>
+          <a:stretch>
+            <a:fillRect/>
+          </a:stretch>
+        </p:blipFill>
+        <p:spPr>
+          <a:xfrm>
+            <a:off x="4628791" y="2098547"/>
+            <a:ext cx="3114675" cy="495300"/>
+          </a:xfrm>
+          <a:prstGeom prst="rect">
+            <a:avLst/>
+          </a:prstGeom>
+        </p:spPr>
+      </p:pic>
+      <p:pic>
+        <p:nvPicPr>
+          <p:cNvPr id="3" name="그림 2" descr="폰트, 타이포그래피, 서예, 텍스트이(가) 표시된 사진&#10;&#10;AI 생성 콘텐츠는 정확하지 않을 수 있습니다.">
+            <a:extLst>
+              <a:ext uri="{FF2B5EF4-FFF2-40B4-BE49-F238E27FC236}">
+                <a16:creationId xmlns:a16="http://schemas.microsoft.com/office/drawing/2014/main" id="{B86FA526-BBCF-A081-03FE-4ABF0DF5323B}"/>
+              </a:ext>
+            </a:extLst>
+          </p:cNvPr>
+          <p:cNvPicPr>
+            <a:picLocks noChangeAspect="1"/>
+          </p:cNvPicPr>
+          <p:nvPr/>
+        </p:nvPicPr>
+        <p:blipFill>
+          <a:blip r:embed="rId4"/>
+          <a:stretch>
+            <a:fillRect/>
+          </a:stretch>
+        </p:blipFill>
+        <p:spPr>
+          <a:xfrm>
+            <a:off x="6103328" y="742320"/>
+            <a:ext cx="5829300" cy="571500"/>
+          </a:xfrm>
+          <a:prstGeom prst="rect">
+            <a:avLst/>
+          </a:prstGeom>
+        </p:spPr>
+      </p:pic>
+    </p:spTree>
+    <p:extLst>
+      <p:ext uri="{BB962C8B-B14F-4D97-AF65-F5344CB8AC3E}">
+        <p14:creationId xmlns:p14="http://schemas.microsoft.com/office/powerpoint/2010/main" val="861769090"/>
+      </p:ext>
+    </p:extLst>
+  </p:cSld>
+  <p:clrMapOvr>
+    <a:masterClrMapping/>
+  </p:clrMapOvr>
+</p:sld>
+</file>
+
+<file path=ppt/slides/slide17.xml><?xml version="1.0" encoding="utf-8"?>
+<p:sld xmlns:a="http://schemas.openxmlformats.org/drawingml/2006/main" xmlns:r="http://schemas.openxmlformats.org/officeDocument/2006/relationships" xmlns:p="http://schemas.openxmlformats.org/presentationml/2006/main">
+  <p:cSld>
+    <p:spTree>
+      <p:nvGrpSpPr>
+        <p:cNvPr id="1" name="">
+          <a:extLst>
+            <a:ext uri="{FF2B5EF4-FFF2-40B4-BE49-F238E27FC236}">
+              <a16:creationId xmlns:a16="http://schemas.microsoft.com/office/drawing/2014/main" id="{A662887F-C232-E029-F094-2D1B71ECCD10}"/>
+            </a:ext>
+          </a:extLst>
+        </p:cNvPr>
+        <p:cNvGrpSpPr/>
+        <p:nvPr/>
+      </p:nvGrpSpPr>
+      <p:grpSpPr>
+        <a:xfrm>
+          <a:off x="0" y="0"/>
+          <a:ext cx="0" cy="0"/>
+          <a:chOff x="0" y="0"/>
+          <a:chExt cx="0" cy="0"/>
+        </a:xfrm>
+      </p:grpSpPr>
+      <p:sp>
+        <p:nvSpPr>
+          <p:cNvPr id="2" name="제목 1">
+            <a:extLst>
+              <a:ext uri="{FF2B5EF4-FFF2-40B4-BE49-F238E27FC236}">
+                <a16:creationId xmlns:a16="http://schemas.microsoft.com/office/drawing/2014/main" id="{275FAC99-90DC-80BA-11DC-C1283D51DD6C}"/>
+              </a:ext>
+            </a:extLst>
+          </p:cNvPr>
+          <p:cNvSpPr>
+            <a:spLocks noGrp="1"/>
+          </p:cNvSpPr>
+          <p:nvPr>
+            <p:ph type="title"/>
+          </p:nvPr>
+        </p:nvSpPr>
+        <p:spPr/>
+        <p:txBody>
+          <a:bodyPr/>
+          <a:lstStyle/>
+          <a:p>
+            <a:r>
+              <a:rPr lang="ko-KR" altLang="en-US" dirty="0" err="1">
+                <a:ea typeface="맑은 고딕"/>
+              </a:rPr>
+              <a:t>Subgradient</a:t>
+            </a:r>
+            <a:r>
+              <a:rPr lang="ko-KR" altLang="en-US" dirty="0">
+                <a:ea typeface="맑은 고딕"/>
+              </a:rPr>
+              <a:t> </a:t>
+            </a:r>
+            <a:r>
+              <a:rPr lang="ko-KR" altLang="en-US" dirty="0" err="1">
+                <a:ea typeface="맑은 고딕"/>
+              </a:rPr>
+              <a:t>method</a:t>
+            </a:r>
+            <a:endParaRPr lang="ko-KR" altLang="en-US" dirty="0" err="1"/>
+          </a:p>
+        </p:txBody>
+      </p:sp>
+      <p:pic>
+        <p:nvPicPr>
+          <p:cNvPr id="10" name="그림 9" descr="폰트, 텍스트, 친필, 라인이(가) 표시된 사진&#10;&#10;AI 생성 콘텐츠는 정확하지 않을 수 있습니다.">
+            <a:extLst>
+              <a:ext uri="{FF2B5EF4-FFF2-40B4-BE49-F238E27FC236}">
+                <a16:creationId xmlns:a16="http://schemas.microsoft.com/office/drawing/2014/main" id="{DA52586D-A1C1-1864-A2A6-1F679770B850}"/>
+              </a:ext>
+            </a:extLst>
+          </p:cNvPr>
+          <p:cNvPicPr>
+            <a:picLocks noChangeAspect="1"/>
+          </p:cNvPicPr>
+          <p:nvPr/>
+        </p:nvPicPr>
+        <p:blipFill>
+          <a:blip r:embed="rId2"/>
+          <a:stretch>
+            <a:fillRect/>
+          </a:stretch>
+        </p:blipFill>
+        <p:spPr>
+          <a:xfrm>
+            <a:off x="937035" y="2684052"/>
+            <a:ext cx="5467350" cy="752475"/>
+          </a:xfrm>
+          <a:prstGeom prst="rect">
+            <a:avLst/>
+          </a:prstGeom>
+        </p:spPr>
+      </p:pic>
+      <p:pic>
+        <p:nvPicPr>
+          <p:cNvPr id="12" name="그림 11" descr="텍스트, 폰트, 라인, 화이트이(가) 표시된 사진&#10;&#10;AI 생성 콘텐츠는 정확하지 않을 수 있습니다.">
+            <a:extLst>
+              <a:ext uri="{FF2B5EF4-FFF2-40B4-BE49-F238E27FC236}">
+                <a16:creationId xmlns:a16="http://schemas.microsoft.com/office/drawing/2014/main" id="{04888EA6-D32D-BAD1-8D47-BF3206DB377D}"/>
+              </a:ext>
+            </a:extLst>
+          </p:cNvPr>
+          <p:cNvPicPr>
+            <a:picLocks noChangeAspect="1"/>
+          </p:cNvPicPr>
+          <p:nvPr/>
+        </p:nvPicPr>
+        <p:blipFill>
+          <a:blip r:embed="rId3"/>
+          <a:stretch>
+            <a:fillRect/>
+          </a:stretch>
+        </p:blipFill>
+        <p:spPr>
+          <a:xfrm>
+            <a:off x="938673" y="1716446"/>
+            <a:ext cx="4857750" cy="704850"/>
+          </a:xfrm>
+          <a:prstGeom prst="rect">
+            <a:avLst/>
+          </a:prstGeom>
+        </p:spPr>
+      </p:pic>
+      <p:pic>
+        <p:nvPicPr>
+          <p:cNvPr id="13" name="그림 12" descr="폰트, 텍스트, 라인, 친필이(가) 표시된 사진&#10;&#10;AI 생성 콘텐츠는 정확하지 않을 수 있습니다.">
+            <a:extLst>
+              <a:ext uri="{FF2B5EF4-FFF2-40B4-BE49-F238E27FC236}">
+                <a16:creationId xmlns:a16="http://schemas.microsoft.com/office/drawing/2014/main" id="{C2C86CF3-D586-BF08-066C-AD5782F4312B}"/>
+              </a:ext>
+            </a:extLst>
+          </p:cNvPr>
+          <p:cNvPicPr>
+            <a:picLocks noChangeAspect="1"/>
+          </p:cNvPicPr>
+          <p:nvPr/>
+        </p:nvPicPr>
+        <p:blipFill>
+          <a:blip r:embed="rId4"/>
+          <a:stretch>
+            <a:fillRect/>
+          </a:stretch>
+        </p:blipFill>
+        <p:spPr>
+          <a:xfrm>
+            <a:off x="938929" y="3629588"/>
+            <a:ext cx="8429625" cy="1057275"/>
+          </a:xfrm>
+          <a:prstGeom prst="rect">
+            <a:avLst/>
+          </a:prstGeom>
+        </p:spPr>
+      </p:pic>
+      <p:pic>
+        <p:nvPicPr>
+          <p:cNvPr id="14" name="그림 13" descr="폰트, 도표, 친필, 화이트이(가) 표시된 사진&#10;&#10;AI 생성 콘텐츠는 정확하지 않을 수 있습니다.">
+            <a:extLst>
+              <a:ext uri="{FF2B5EF4-FFF2-40B4-BE49-F238E27FC236}">
+                <a16:creationId xmlns:a16="http://schemas.microsoft.com/office/drawing/2014/main" id="{E5AFF17E-5DDF-36E0-F9FE-464182AE9F30}"/>
+              </a:ext>
+            </a:extLst>
+          </p:cNvPr>
+          <p:cNvPicPr>
+            <a:picLocks noChangeAspect="1"/>
+          </p:cNvPicPr>
+          <p:nvPr/>
+        </p:nvPicPr>
+        <p:blipFill>
+          <a:blip r:embed="rId5"/>
+          <a:stretch>
+            <a:fillRect/>
+          </a:stretch>
+        </p:blipFill>
+        <p:spPr>
+          <a:xfrm>
+            <a:off x="938007" y="5213247"/>
+            <a:ext cx="5629275" cy="1200150"/>
+          </a:xfrm>
+          <a:prstGeom prst="rect">
+            <a:avLst/>
+          </a:prstGeom>
+        </p:spPr>
+      </p:pic>
+      <p:pic>
+        <p:nvPicPr>
+          <p:cNvPr id="15" name="그림 14" descr="폰트, 친필, 서예, 타이포그래피이(가) 표시된 사진&#10;&#10;AI 생성 콘텐츠는 정확하지 않을 수 있습니다.">
+            <a:extLst>
+              <a:ext uri="{FF2B5EF4-FFF2-40B4-BE49-F238E27FC236}">
+                <a16:creationId xmlns:a16="http://schemas.microsoft.com/office/drawing/2014/main" id="{9D39EDD6-6CE4-DD9A-2906-FA7786357E21}"/>
+              </a:ext>
+            </a:extLst>
+          </p:cNvPr>
+          <p:cNvPicPr>
+            <a:picLocks noChangeAspect="1"/>
+          </p:cNvPicPr>
+          <p:nvPr/>
+        </p:nvPicPr>
+        <p:blipFill>
+          <a:blip r:embed="rId6"/>
+          <a:stretch>
+            <a:fillRect/>
+          </a:stretch>
+        </p:blipFill>
+        <p:spPr>
+          <a:xfrm>
+            <a:off x="6736376" y="5625127"/>
+            <a:ext cx="2619375" cy="523875"/>
+          </a:xfrm>
+          <a:prstGeom prst="rect">
+            <a:avLst/>
+          </a:prstGeom>
+        </p:spPr>
+      </p:pic>
+      <p:pic>
+        <p:nvPicPr>
+          <p:cNvPr id="4" name="그림 3" descr="폰트, 텍스트, 친필, 화이트이(가) 표시된 사진&#10;&#10;AI 생성 콘텐츠는 정확하지 않을 수 있습니다.">
+            <a:extLst>
+              <a:ext uri="{FF2B5EF4-FFF2-40B4-BE49-F238E27FC236}">
+                <a16:creationId xmlns:a16="http://schemas.microsoft.com/office/drawing/2014/main" id="{CC5B9941-26D7-22AA-28A6-00DD918FF662}"/>
+              </a:ext>
+            </a:extLst>
+          </p:cNvPr>
+          <p:cNvPicPr>
+            <a:picLocks noChangeAspect="1"/>
+          </p:cNvPicPr>
+          <p:nvPr/>
+        </p:nvPicPr>
+        <p:blipFill>
+          <a:blip r:embed="rId7"/>
+          <a:srcRect l="11481" r="-166" b="-1250"/>
+          <a:stretch>
+            <a:fillRect/>
+          </a:stretch>
+        </p:blipFill>
+        <p:spPr>
+          <a:xfrm>
+            <a:off x="1461509" y="1681223"/>
+            <a:ext cx="4837087" cy="735704"/>
+          </a:xfrm>
+          <a:prstGeom prst="rect">
+            <a:avLst/>
+          </a:prstGeom>
+        </p:spPr>
+      </p:pic>
+    </p:spTree>
+    <p:extLst>
+      <p:ext uri="{BB962C8B-B14F-4D97-AF65-F5344CB8AC3E}">
+        <p14:creationId xmlns:p14="http://schemas.microsoft.com/office/powerpoint/2010/main" val="1136358768"/>
+      </p:ext>
+    </p:extLst>
+  </p:cSld>
+  <p:clrMapOvr>
+    <a:masterClrMapping/>
+  </p:clrMapOvr>
+</p:sld>
+</file>
+
+<file path=ppt/slides/slide18.xml><?xml version="1.0" encoding="utf-8"?>
+<p:sld xmlns:a="http://schemas.openxmlformats.org/drawingml/2006/main" xmlns:r="http://schemas.openxmlformats.org/officeDocument/2006/relationships" xmlns:p="http://schemas.openxmlformats.org/presentationml/2006/main">
+  <p:cSld>
+    <p:spTree>
+      <p:nvGrpSpPr>
+        <p:cNvPr id="1" name=""/>
+        <p:cNvGrpSpPr/>
+        <p:nvPr/>
+      </p:nvGrpSpPr>
+      <p:grpSpPr>
+        <a:xfrm>
+          <a:off x="0" y="0"/>
+          <a:ext cx="0" cy="0"/>
+          <a:chOff x="0" y="0"/>
+          <a:chExt cx="0" cy="0"/>
+        </a:xfrm>
+      </p:grpSpPr>
+      <p:sp>
+        <p:nvSpPr>
+          <p:cNvPr id="2" name="제목 1">
+            <a:extLst>
+              <a:ext uri="{FF2B5EF4-FFF2-40B4-BE49-F238E27FC236}">
                 <a16:creationId xmlns:a16="http://schemas.microsoft.com/office/drawing/2014/main" id="{CDA72200-768A-356E-8C50-2D2CD9B2CFE4}"/>
               </a:ext>
             </a:extLst>
@@ -4689,7 +5217,7 @@
 </p:sld>
 </file>
 
-<file path=ppt/slides/slide16.xml><?xml version="1.0" encoding="utf-8"?>
+<file path=ppt/slides/slide19.xml><?xml version="1.0" encoding="utf-8"?>
 <p:sld xmlns:a="http://schemas.openxmlformats.org/drawingml/2006/main" xmlns:r="http://schemas.openxmlformats.org/officeDocument/2006/relationships" xmlns:p="http://schemas.openxmlformats.org/presentationml/2006/main">
   <p:cSld>
     <p:spTree>
@@ -4988,7 +5516,200 @@
 </p:sld>
 </file>
 
-<file path=ppt/slides/slide17.xml><?xml version="1.0" encoding="utf-8"?>
+<file path=ppt/slides/slide2.xml><?xml version="1.0" encoding="utf-8"?>
+<p:sld xmlns:a="http://schemas.openxmlformats.org/drawingml/2006/main" xmlns:r="http://schemas.openxmlformats.org/officeDocument/2006/relationships" xmlns:p="http://schemas.openxmlformats.org/presentationml/2006/main">
+  <p:cSld>
+    <p:spTree>
+      <p:nvGrpSpPr>
+        <p:cNvPr id="1" name=""/>
+        <p:cNvGrpSpPr/>
+        <p:nvPr/>
+      </p:nvGrpSpPr>
+      <p:grpSpPr>
+        <a:xfrm>
+          <a:off x="0" y="0"/>
+          <a:ext cx="0" cy="0"/>
+          <a:chOff x="0" y="0"/>
+          <a:chExt cx="0" cy="0"/>
+        </a:xfrm>
+      </p:grpSpPr>
+      <p:sp>
+        <p:nvSpPr>
+          <p:cNvPr id="2" name="제목 1">
+            <a:extLst>
+              <a:ext uri="{FF2B5EF4-FFF2-40B4-BE49-F238E27FC236}">
+                <a16:creationId xmlns:a16="http://schemas.microsoft.com/office/drawing/2014/main" id="{D21A9E78-6CF3-153A-F868-248BD0C67E58}"/>
+              </a:ext>
+            </a:extLst>
+          </p:cNvPr>
+          <p:cNvSpPr>
+            <a:spLocks noGrp="1"/>
+          </p:cNvSpPr>
+          <p:nvPr>
+            <p:ph type="title"/>
+          </p:nvPr>
+        </p:nvSpPr>
+        <p:spPr/>
+        <p:txBody>
+          <a:bodyPr/>
+          <a:lstStyle/>
+          <a:p>
+            <a:endParaRPr lang="ko-KR" altLang="en-US"/>
+          </a:p>
+        </p:txBody>
+      </p:sp>
+      <p:pic>
+        <p:nvPicPr>
+          <p:cNvPr id="4" name="그림 3" descr="텍스트, 스크린샷, 폰트, 번호이(가) 표시된 사진&#10;&#10;AI 생성 콘텐츠는 정확하지 않을 수 있습니다.">
+            <a:extLst>
+              <a:ext uri="{FF2B5EF4-FFF2-40B4-BE49-F238E27FC236}">
+                <a16:creationId xmlns:a16="http://schemas.microsoft.com/office/drawing/2014/main" id="{7B42D9F8-077A-660C-1232-D55EE7DC3CC0}"/>
+              </a:ext>
+            </a:extLst>
+          </p:cNvPr>
+          <p:cNvPicPr>
+            <a:picLocks noChangeAspect="1"/>
+          </p:cNvPicPr>
+          <p:nvPr/>
+        </p:nvPicPr>
+        <p:blipFill>
+          <a:blip r:embed="rId2"/>
+          <a:stretch>
+            <a:fillRect/>
+          </a:stretch>
+        </p:blipFill>
+        <p:spPr>
+          <a:xfrm>
+            <a:off x="2005445" y="0"/>
+            <a:ext cx="8181109" cy="6858000"/>
+          </a:xfrm>
+          <a:prstGeom prst="rect">
+            <a:avLst/>
+          </a:prstGeom>
+        </p:spPr>
+      </p:pic>
+      <p:sp>
+        <p:nvSpPr>
+          <p:cNvPr id="5" name="직사각형 4">
+            <a:extLst>
+              <a:ext uri="{FF2B5EF4-FFF2-40B4-BE49-F238E27FC236}">
+                <a16:creationId xmlns:a16="http://schemas.microsoft.com/office/drawing/2014/main" id="{8CA88493-6DB3-3606-5937-35A6AB2F7B9A}"/>
+              </a:ext>
+            </a:extLst>
+          </p:cNvPr>
+          <p:cNvSpPr/>
+          <p:nvPr/>
+        </p:nvSpPr>
+        <p:spPr>
+          <a:xfrm>
+            <a:off x="2098109" y="929012"/>
+            <a:ext cx="866383" cy="240083"/>
+          </a:xfrm>
+          <a:prstGeom prst="rect">
+            <a:avLst/>
+          </a:prstGeom>
+          <a:solidFill>
+            <a:schemeClr val="tx1"/>
+          </a:solidFill>
+          <a:ln>
+            <a:solidFill>
+              <a:schemeClr val="tx1"/>
+            </a:solidFill>
+          </a:ln>
+        </p:spPr>
+        <p:style>
+          <a:lnRef idx="2">
+            <a:schemeClr val="accent1">
+              <a:shade val="15000"/>
+            </a:schemeClr>
+          </a:lnRef>
+          <a:fillRef idx="1">
+            <a:schemeClr val="accent1"/>
+          </a:fillRef>
+          <a:effectRef idx="0">
+            <a:schemeClr val="accent1"/>
+          </a:effectRef>
+          <a:fontRef idx="minor">
+            <a:schemeClr val="lt1"/>
+          </a:fontRef>
+        </p:style>
+        <p:txBody>
+          <a:bodyPr rtlCol="0" anchor="ctr"/>
+          <a:lstStyle/>
+          <a:p>
+            <a:pPr algn="ctr"/>
+            <a:endParaRPr lang="ko-KR" altLang="en-US"/>
+          </a:p>
+        </p:txBody>
+      </p:sp>
+      <p:sp>
+        <p:nvSpPr>
+          <p:cNvPr id="6" name="직사각형 5">
+            <a:extLst>
+              <a:ext uri="{FF2B5EF4-FFF2-40B4-BE49-F238E27FC236}">
+                <a16:creationId xmlns:a16="http://schemas.microsoft.com/office/drawing/2014/main" id="{42E0196F-CE7D-8569-F41E-94E9F8C4BCE3}"/>
+              </a:ext>
+            </a:extLst>
+          </p:cNvPr>
+          <p:cNvSpPr/>
+          <p:nvPr/>
+        </p:nvSpPr>
+        <p:spPr>
+          <a:xfrm>
+            <a:off x="2098108" y="83506"/>
+            <a:ext cx="511479" cy="187892"/>
+          </a:xfrm>
+          <a:prstGeom prst="rect">
+            <a:avLst/>
+          </a:prstGeom>
+          <a:solidFill>
+            <a:schemeClr val="tx1"/>
+          </a:solidFill>
+          <a:ln>
+            <a:solidFill>
+              <a:schemeClr val="tx1"/>
+            </a:solidFill>
+          </a:ln>
+        </p:spPr>
+        <p:style>
+          <a:lnRef idx="2">
+            <a:schemeClr val="accent1">
+              <a:shade val="15000"/>
+            </a:schemeClr>
+          </a:lnRef>
+          <a:fillRef idx="1">
+            <a:schemeClr val="accent1"/>
+          </a:fillRef>
+          <a:effectRef idx="0">
+            <a:schemeClr val="accent1"/>
+          </a:effectRef>
+          <a:fontRef idx="minor">
+            <a:schemeClr val="lt1"/>
+          </a:fontRef>
+        </p:style>
+        <p:txBody>
+          <a:bodyPr rtlCol="0" anchor="ctr"/>
+          <a:lstStyle/>
+          <a:p>
+            <a:pPr algn="ctr"/>
+            <a:endParaRPr lang="ko-KR" altLang="en-US"/>
+          </a:p>
+        </p:txBody>
+      </p:sp>
+    </p:spTree>
+    <p:extLst>
+      <p:ext uri="{BB962C8B-B14F-4D97-AF65-F5344CB8AC3E}">
+        <p14:creationId xmlns:p14="http://schemas.microsoft.com/office/powerpoint/2010/main" val="2183170989"/>
+      </p:ext>
+    </p:extLst>
+  </p:cSld>
+  <p:clrMapOvr>
+    <a:masterClrMapping/>
+  </p:clrMapOvr>
+</p:sld>
+</file>
+
+<file path=ppt/slides/slide20.xml><?xml version="1.0" encoding="utf-8"?>
 <p:sld xmlns:a="http://schemas.openxmlformats.org/drawingml/2006/main" xmlns:r="http://schemas.openxmlformats.org/officeDocument/2006/relationships" xmlns:p="http://schemas.openxmlformats.org/presentationml/2006/main">
   <p:cSld>
     <p:spTree>
@@ -5134,7 +5855,7 @@
 </p:sld>
 </file>
 
-<file path=ppt/slides/slide18.xml><?xml version="1.0" encoding="utf-8"?>
+<file path=ppt/slides/slide21.xml><?xml version="1.0" encoding="utf-8"?>
 <p:sld xmlns:a="http://schemas.openxmlformats.org/drawingml/2006/main" xmlns:r="http://schemas.openxmlformats.org/officeDocument/2006/relationships" xmlns:p="http://schemas.openxmlformats.org/presentationml/2006/main">
   <p:cSld>
     <p:spTree>
@@ -5326,7 +6047,7 @@
 </p:sld>
 </file>
 
-<file path=ppt/slides/slide19.xml><?xml version="1.0" encoding="utf-8"?>
+<file path=ppt/slides/slide22.xml><?xml version="1.0" encoding="utf-8"?>
 <p:sld xmlns:a="http://schemas.openxmlformats.org/drawingml/2006/main" xmlns:r="http://schemas.openxmlformats.org/officeDocument/2006/relationships" xmlns:p="http://schemas.openxmlformats.org/presentationml/2006/main">
   <p:cSld>
     <p:spTree>
@@ -5377,199 +6098,6 @@
     <p:extLst>
       <p:ext uri="{BB962C8B-B14F-4D97-AF65-F5344CB8AC3E}">
         <p14:creationId xmlns:p14="http://schemas.microsoft.com/office/powerpoint/2010/main" val="2487246222"/>
-      </p:ext>
-    </p:extLst>
-  </p:cSld>
-  <p:clrMapOvr>
-    <a:masterClrMapping/>
-  </p:clrMapOvr>
-</p:sld>
-</file>
-
-<file path=ppt/slides/slide2.xml><?xml version="1.0" encoding="utf-8"?>
-<p:sld xmlns:a="http://schemas.openxmlformats.org/drawingml/2006/main" xmlns:r="http://schemas.openxmlformats.org/officeDocument/2006/relationships" xmlns:p="http://schemas.openxmlformats.org/presentationml/2006/main">
-  <p:cSld>
-    <p:spTree>
-      <p:nvGrpSpPr>
-        <p:cNvPr id="1" name=""/>
-        <p:cNvGrpSpPr/>
-        <p:nvPr/>
-      </p:nvGrpSpPr>
-      <p:grpSpPr>
-        <a:xfrm>
-          <a:off x="0" y="0"/>
-          <a:ext cx="0" cy="0"/>
-          <a:chOff x="0" y="0"/>
-          <a:chExt cx="0" cy="0"/>
-        </a:xfrm>
-      </p:grpSpPr>
-      <p:sp>
-        <p:nvSpPr>
-          <p:cNvPr id="2" name="제목 1">
-            <a:extLst>
-              <a:ext uri="{FF2B5EF4-FFF2-40B4-BE49-F238E27FC236}">
-                <a16:creationId xmlns:a16="http://schemas.microsoft.com/office/drawing/2014/main" id="{D21A9E78-6CF3-153A-F868-248BD0C67E58}"/>
-              </a:ext>
-            </a:extLst>
-          </p:cNvPr>
-          <p:cNvSpPr>
-            <a:spLocks noGrp="1"/>
-          </p:cNvSpPr>
-          <p:nvPr>
-            <p:ph type="title"/>
-          </p:nvPr>
-        </p:nvSpPr>
-        <p:spPr/>
-        <p:txBody>
-          <a:bodyPr/>
-          <a:lstStyle/>
-          <a:p>
-            <a:endParaRPr lang="ko-KR" altLang="en-US"/>
-          </a:p>
-        </p:txBody>
-      </p:sp>
-      <p:pic>
-        <p:nvPicPr>
-          <p:cNvPr id="4" name="그림 3" descr="텍스트, 스크린샷, 폰트, 번호이(가) 표시된 사진&#10;&#10;AI 생성 콘텐츠는 정확하지 않을 수 있습니다.">
-            <a:extLst>
-              <a:ext uri="{FF2B5EF4-FFF2-40B4-BE49-F238E27FC236}">
-                <a16:creationId xmlns:a16="http://schemas.microsoft.com/office/drawing/2014/main" id="{7B42D9F8-077A-660C-1232-D55EE7DC3CC0}"/>
-              </a:ext>
-            </a:extLst>
-          </p:cNvPr>
-          <p:cNvPicPr>
-            <a:picLocks noChangeAspect="1"/>
-          </p:cNvPicPr>
-          <p:nvPr/>
-        </p:nvPicPr>
-        <p:blipFill>
-          <a:blip r:embed="rId2"/>
-          <a:stretch>
-            <a:fillRect/>
-          </a:stretch>
-        </p:blipFill>
-        <p:spPr>
-          <a:xfrm>
-            <a:off x="2005445" y="0"/>
-            <a:ext cx="8181109" cy="6858000"/>
-          </a:xfrm>
-          <a:prstGeom prst="rect">
-            <a:avLst/>
-          </a:prstGeom>
-        </p:spPr>
-      </p:pic>
-      <p:sp>
-        <p:nvSpPr>
-          <p:cNvPr id="5" name="직사각형 4">
-            <a:extLst>
-              <a:ext uri="{FF2B5EF4-FFF2-40B4-BE49-F238E27FC236}">
-                <a16:creationId xmlns:a16="http://schemas.microsoft.com/office/drawing/2014/main" id="{8CA88493-6DB3-3606-5937-35A6AB2F7B9A}"/>
-              </a:ext>
-            </a:extLst>
-          </p:cNvPr>
-          <p:cNvSpPr/>
-          <p:nvPr/>
-        </p:nvSpPr>
-        <p:spPr>
-          <a:xfrm>
-            <a:off x="2098109" y="929012"/>
-            <a:ext cx="866383" cy="240083"/>
-          </a:xfrm>
-          <a:prstGeom prst="rect">
-            <a:avLst/>
-          </a:prstGeom>
-          <a:solidFill>
-            <a:schemeClr val="tx1"/>
-          </a:solidFill>
-          <a:ln>
-            <a:solidFill>
-              <a:schemeClr val="tx1"/>
-            </a:solidFill>
-          </a:ln>
-        </p:spPr>
-        <p:style>
-          <a:lnRef idx="2">
-            <a:schemeClr val="accent1">
-              <a:shade val="15000"/>
-            </a:schemeClr>
-          </a:lnRef>
-          <a:fillRef idx="1">
-            <a:schemeClr val="accent1"/>
-          </a:fillRef>
-          <a:effectRef idx="0">
-            <a:schemeClr val="accent1"/>
-          </a:effectRef>
-          <a:fontRef idx="minor">
-            <a:schemeClr val="lt1"/>
-          </a:fontRef>
-        </p:style>
-        <p:txBody>
-          <a:bodyPr rtlCol="0" anchor="ctr"/>
-          <a:lstStyle/>
-          <a:p>
-            <a:pPr algn="ctr"/>
-            <a:endParaRPr lang="ko-KR" altLang="en-US"/>
-          </a:p>
-        </p:txBody>
-      </p:sp>
-      <p:sp>
-        <p:nvSpPr>
-          <p:cNvPr id="6" name="직사각형 5">
-            <a:extLst>
-              <a:ext uri="{FF2B5EF4-FFF2-40B4-BE49-F238E27FC236}">
-                <a16:creationId xmlns:a16="http://schemas.microsoft.com/office/drawing/2014/main" id="{42E0196F-CE7D-8569-F41E-94E9F8C4BCE3}"/>
-              </a:ext>
-            </a:extLst>
-          </p:cNvPr>
-          <p:cNvSpPr/>
-          <p:nvPr/>
-        </p:nvSpPr>
-        <p:spPr>
-          <a:xfrm>
-            <a:off x="2098108" y="83506"/>
-            <a:ext cx="511479" cy="187892"/>
-          </a:xfrm>
-          <a:prstGeom prst="rect">
-            <a:avLst/>
-          </a:prstGeom>
-          <a:solidFill>
-            <a:schemeClr val="tx1"/>
-          </a:solidFill>
-          <a:ln>
-            <a:solidFill>
-              <a:schemeClr val="tx1"/>
-            </a:solidFill>
-          </a:ln>
-        </p:spPr>
-        <p:style>
-          <a:lnRef idx="2">
-            <a:schemeClr val="accent1">
-              <a:shade val="15000"/>
-            </a:schemeClr>
-          </a:lnRef>
-          <a:fillRef idx="1">
-            <a:schemeClr val="accent1"/>
-          </a:fillRef>
-          <a:effectRef idx="0">
-            <a:schemeClr val="accent1"/>
-          </a:effectRef>
-          <a:fontRef idx="minor">
-            <a:schemeClr val="lt1"/>
-          </a:fontRef>
-        </p:style>
-        <p:txBody>
-          <a:bodyPr rtlCol="0" anchor="ctr"/>
-          <a:lstStyle/>
-          <a:p>
-            <a:pPr algn="ctr"/>
-            <a:endParaRPr lang="ko-KR" altLang="en-US"/>
-          </a:p>
-        </p:txBody>
-      </p:sp>
-    </p:spTree>
-    <p:extLst>
-      <p:ext uri="{BB962C8B-B14F-4D97-AF65-F5344CB8AC3E}">
-        <p14:creationId xmlns:p14="http://schemas.microsoft.com/office/powerpoint/2010/main" val="2183170989"/>
       </p:ext>
     </p:extLst>
   </p:cSld>

</xml_diff>